<commit_message>
Auto-deploy: Update book and slides
</commit_message>
<xml_diff>
--- a/slides/lecture1-intro.pptx
+++ b/slides/lecture1-intro.pptx
@@ -4,9 +4,6 @@
   <p:sldMasterIdLst>
     <p:sldMasterId id="2147483648" r:id="rId1"/>
   </p:sldMasterIdLst>
-  <p:notesMasterIdLst>
-    <p:notesMasterId r:id="rId33"/>
-  </p:notesMasterIdLst>
   <p:sldIdLst>
     <p:sldId id="256" r:id="rId2"/>
     <p:sldId id="257" r:id="rId3"/>
@@ -39,6 +36,7 @@
     <p:sldId id="284" r:id="rId30"/>
     <p:sldId id="285" r:id="rId31"/>
     <p:sldId id="286" r:id="rId32"/>
+    <p:sldId id="287" r:id="rId33"/>
   </p:sldIdLst>
   <p:sldSz cx="9144000" cy="5143500" type="screen16x9"/>
   <p:notesSz cx="6858000" cy="9144000"/>
@@ -154,437 +152,6 @@
     </p:ext>
   </p:extLst>
 </p:presentation>
-</file>
-
-<file path=ppt/notesMasters/notesMaster1.xml><?xml version="1.0" encoding="utf-8"?>
-<p:notesMaster xmlns:a="http://schemas.openxmlformats.org/drawingml/2006/main" xmlns:r="http://schemas.openxmlformats.org/officeDocument/2006/relationships" xmlns:p="http://schemas.openxmlformats.org/presentationml/2006/main">
-  <p:cSld>
-    <p:bg>
-      <p:bgRef idx="1001">
-        <a:schemeClr val="bg1"/>
-      </p:bgRef>
-    </p:bg>
-    <p:spTree>
-      <p:nvGrpSpPr>
-        <p:cNvPr id="1" name=""/>
-        <p:cNvGrpSpPr/>
-        <p:nvPr/>
-      </p:nvGrpSpPr>
-      <p:grpSpPr>
-        <a:xfrm>
-          <a:off x="0" y="0"/>
-          <a:ext cx="0" cy="0"/>
-          <a:chOff x="0" y="0"/>
-          <a:chExt cx="0" cy="0"/>
-        </a:xfrm>
-      </p:grpSpPr>
-      <p:sp>
-        <p:nvSpPr>
-          <p:cNvPr id="2" name="Header Placeholder 1"/>
-          <p:cNvSpPr>
-            <a:spLocks noGrp="1"/>
-          </p:cNvSpPr>
-          <p:nvPr>
-            <p:ph type="hdr" sz="quarter"/>
-          </p:nvPr>
-        </p:nvSpPr>
-        <p:spPr>
-          <a:xfrm>
-            <a:off x="0" y="0"/>
-            <a:ext cx="2971800" cy="458788"/>
-          </a:xfrm>
-          <a:prstGeom prst="rect">
-            <a:avLst/>
-          </a:prstGeom>
-        </p:spPr>
-        <p:txBody>
-          <a:bodyPr vert="horz" lIns="91440" tIns="45720" rIns="91440" bIns="45720" rtlCol="0"/>
-          <a:lstStyle>
-            <a:lvl1pPr algn="l">
-              <a:defRPr sz="1200"/>
-            </a:lvl1pPr>
-          </a:lstStyle>
-          <a:p>
-            <a:endParaRPr lang="en-US"/>
-          </a:p>
-        </p:txBody>
-      </p:sp>
-      <p:sp>
-        <p:nvSpPr>
-          <p:cNvPr id="3" name="Date Placeholder 2"/>
-          <p:cNvSpPr>
-            <a:spLocks noGrp="1"/>
-          </p:cNvSpPr>
-          <p:nvPr>
-            <p:ph type="dt" idx="1"/>
-          </p:nvPr>
-        </p:nvSpPr>
-        <p:spPr>
-          <a:xfrm>
-            <a:off x="3884613" y="0"/>
-            <a:ext cx="2971800" cy="458788"/>
-          </a:xfrm>
-          <a:prstGeom prst="rect">
-            <a:avLst/>
-          </a:prstGeom>
-        </p:spPr>
-        <p:txBody>
-          <a:bodyPr vert="horz" lIns="91440" tIns="45720" rIns="91440" bIns="45720" rtlCol="0"/>
-          <a:lstStyle>
-            <a:lvl1pPr algn="r">
-              <a:defRPr sz="1200"/>
-            </a:lvl1pPr>
-          </a:lstStyle>
-          <a:p>
-            <a:fld id="{0F9C1CCF-B725-44A7-AA57-5E433BD85C9F}" type="datetimeFigureOut">
-              <a:rPr lang="en-US" smtClean="0"/>
-              <a:t>2/7/25</a:t>
-            </a:fld>
-            <a:endParaRPr lang="en-US"/>
-          </a:p>
-        </p:txBody>
-      </p:sp>
-      <p:sp>
-        <p:nvSpPr>
-          <p:cNvPr id="4" name="Slide Image Placeholder 3"/>
-          <p:cNvSpPr>
-            <a:spLocks noGrp="1" noRot="1" noChangeAspect="1"/>
-          </p:cNvSpPr>
-          <p:nvPr>
-            <p:ph type="sldImg" idx="2"/>
-          </p:nvPr>
-        </p:nvSpPr>
-        <p:spPr>
-          <a:xfrm>
-            <a:off x="685800" y="1143000"/>
-            <a:ext cx="5486400" cy="3086100"/>
-          </a:xfrm>
-          <a:prstGeom prst="rect">
-            <a:avLst/>
-          </a:prstGeom>
-          <a:noFill/>
-          <a:ln w="12700">
-            <a:solidFill>
-              <a:prstClr val="black"/>
-            </a:solidFill>
-          </a:ln>
-        </p:spPr>
-        <p:txBody>
-          <a:bodyPr vert="horz" lIns="91440" tIns="45720" rIns="91440" bIns="45720" rtlCol="0" anchor="ctr"/>
-          <a:lstStyle/>
-          <a:p>
-            <a:endParaRPr lang="en-US"/>
-          </a:p>
-        </p:txBody>
-      </p:sp>
-      <p:sp>
-        <p:nvSpPr>
-          <p:cNvPr id="5" name="Notes Placeholder 4"/>
-          <p:cNvSpPr>
-            <a:spLocks noGrp="1"/>
-          </p:cNvSpPr>
-          <p:nvPr>
-            <p:ph type="body" sz="quarter" idx="3"/>
-          </p:nvPr>
-        </p:nvSpPr>
-        <p:spPr>
-          <a:xfrm>
-            <a:off x="685800" y="4400550"/>
-            <a:ext cx="5486400" cy="3600450"/>
-          </a:xfrm>
-          <a:prstGeom prst="rect">
-            <a:avLst/>
-          </a:prstGeom>
-        </p:spPr>
-        <p:txBody>
-          <a:bodyPr vert="horz" lIns="91440" tIns="45720" rIns="91440" bIns="45720" rtlCol="0"/>
-          <a:lstStyle/>
-          <a:p>
-            <a:pPr lvl="0"/>
-            <a:r>
-              <a:rPr lang="en-US"/>
-              <a:t>Click to edit Master text styles</a:t>
-            </a:r>
-          </a:p>
-          <a:p>
-            <a:pPr lvl="1"/>
-            <a:r>
-              <a:rPr lang="en-US"/>
-              <a:t>Second level</a:t>
-            </a:r>
-          </a:p>
-          <a:p>
-            <a:pPr lvl="2"/>
-            <a:r>
-              <a:rPr lang="en-US"/>
-              <a:t>Third level</a:t>
-            </a:r>
-          </a:p>
-          <a:p>
-            <a:pPr lvl="3"/>
-            <a:r>
-              <a:rPr lang="en-US"/>
-              <a:t>Fourth level</a:t>
-            </a:r>
-          </a:p>
-          <a:p>
-            <a:pPr lvl="4"/>
-            <a:r>
-              <a:rPr lang="en-US"/>
-              <a:t>Fifth level</a:t>
-            </a:r>
-          </a:p>
-        </p:txBody>
-      </p:sp>
-      <p:sp>
-        <p:nvSpPr>
-          <p:cNvPr id="6" name="Footer Placeholder 5"/>
-          <p:cNvSpPr>
-            <a:spLocks noGrp="1"/>
-          </p:cNvSpPr>
-          <p:nvPr>
-            <p:ph type="ftr" sz="quarter" idx="4"/>
-          </p:nvPr>
-        </p:nvSpPr>
-        <p:spPr>
-          <a:xfrm>
-            <a:off x="0" y="8685213"/>
-            <a:ext cx="2971800" cy="458787"/>
-          </a:xfrm>
-          <a:prstGeom prst="rect">
-            <a:avLst/>
-          </a:prstGeom>
-        </p:spPr>
-        <p:txBody>
-          <a:bodyPr vert="horz" lIns="91440" tIns="45720" rIns="91440" bIns="45720" rtlCol="0" anchor="b"/>
-          <a:lstStyle>
-            <a:lvl1pPr algn="l">
-              <a:defRPr sz="1200"/>
-            </a:lvl1pPr>
-          </a:lstStyle>
-          <a:p>
-            <a:endParaRPr lang="en-US"/>
-          </a:p>
-        </p:txBody>
-      </p:sp>
-      <p:sp>
-        <p:nvSpPr>
-          <p:cNvPr id="7" name="Slide Number Placeholder 6"/>
-          <p:cNvSpPr>
-            <a:spLocks noGrp="1"/>
-          </p:cNvSpPr>
-          <p:nvPr>
-            <p:ph type="sldNum" sz="quarter" idx="5"/>
-          </p:nvPr>
-        </p:nvSpPr>
-        <p:spPr>
-          <a:xfrm>
-            <a:off x="3884613" y="8685213"/>
-            <a:ext cx="2971800" cy="458787"/>
-          </a:xfrm>
-          <a:prstGeom prst="rect">
-            <a:avLst/>
-          </a:prstGeom>
-        </p:spPr>
-        <p:txBody>
-          <a:bodyPr vert="horz" lIns="91440" tIns="45720" rIns="91440" bIns="45720" rtlCol="0" anchor="b"/>
-          <a:lstStyle>
-            <a:lvl1pPr algn="r">
-              <a:defRPr sz="1200"/>
-            </a:lvl1pPr>
-          </a:lstStyle>
-          <a:p>
-            <a:fld id="{18BDFEC3-8487-43E8-A154-7C12CBC1FFF2}" type="slidenum">
-              <a:rPr lang="en-US" smtClean="0"/>
-              <a:t>‹#›</a:t>
-            </a:fld>
-            <a:endParaRPr lang="en-US"/>
-          </a:p>
-        </p:txBody>
-      </p:sp>
-    </p:spTree>
-    <p:extLst>
-      <p:ext uri="{BB962C8B-B14F-4D97-AF65-F5344CB8AC3E}">
-        <p14:creationId xmlns:p14="http://schemas.microsoft.com/office/powerpoint/2010/main" val="3782709779"/>
-      </p:ext>
-    </p:extLst>
-  </p:cSld>
-  <p:clrMap bg1="lt1" tx1="dk1" bg2="lt2" tx2="dk2" accent1="accent1" accent2="accent2" accent3="accent3" accent4="accent4" accent5="accent5" accent6="accent6" hlink="hlink" folHlink="folHlink"/>
-  <p:notesStyle>
-    <a:lvl1pPr marL="0" algn="l" defTabSz="914400" rtl="0" eaLnBrk="1" latinLnBrk="0" hangingPunct="1">
-      <a:defRPr sz="1200" kern="1200">
-        <a:solidFill>
-          <a:schemeClr val="tx1"/>
-        </a:solidFill>
-        <a:latin typeface="+mn-lt"/>
-        <a:ea typeface="+mn-ea"/>
-        <a:cs typeface="+mn-cs"/>
-      </a:defRPr>
-    </a:lvl1pPr>
-    <a:lvl2pPr marL="457200" algn="l" defTabSz="914400" rtl="0" eaLnBrk="1" latinLnBrk="0" hangingPunct="1">
-      <a:defRPr sz="1200" kern="1200">
-        <a:solidFill>
-          <a:schemeClr val="tx1"/>
-        </a:solidFill>
-        <a:latin typeface="+mn-lt"/>
-        <a:ea typeface="+mn-ea"/>
-        <a:cs typeface="+mn-cs"/>
-      </a:defRPr>
-    </a:lvl2pPr>
-    <a:lvl3pPr marL="914400" algn="l" defTabSz="914400" rtl="0" eaLnBrk="1" latinLnBrk="0" hangingPunct="1">
-      <a:defRPr sz="1200" kern="1200">
-        <a:solidFill>
-          <a:schemeClr val="tx1"/>
-        </a:solidFill>
-        <a:latin typeface="+mn-lt"/>
-        <a:ea typeface="+mn-ea"/>
-        <a:cs typeface="+mn-cs"/>
-      </a:defRPr>
-    </a:lvl3pPr>
-    <a:lvl4pPr marL="1371600" algn="l" defTabSz="914400" rtl="0" eaLnBrk="1" latinLnBrk="0" hangingPunct="1">
-      <a:defRPr sz="1200" kern="1200">
-        <a:solidFill>
-          <a:schemeClr val="tx1"/>
-        </a:solidFill>
-        <a:latin typeface="+mn-lt"/>
-        <a:ea typeface="+mn-ea"/>
-        <a:cs typeface="+mn-cs"/>
-      </a:defRPr>
-    </a:lvl4pPr>
-    <a:lvl5pPr marL="1828800" algn="l" defTabSz="914400" rtl="0" eaLnBrk="1" latinLnBrk="0" hangingPunct="1">
-      <a:defRPr sz="1200" kern="1200">
-        <a:solidFill>
-          <a:schemeClr val="tx1"/>
-        </a:solidFill>
-        <a:latin typeface="+mn-lt"/>
-        <a:ea typeface="+mn-ea"/>
-        <a:cs typeface="+mn-cs"/>
-      </a:defRPr>
-    </a:lvl5pPr>
-    <a:lvl6pPr marL="2286000" algn="l" defTabSz="914400" rtl="0" eaLnBrk="1" latinLnBrk="0" hangingPunct="1">
-      <a:defRPr sz="1200" kern="1200">
-        <a:solidFill>
-          <a:schemeClr val="tx1"/>
-        </a:solidFill>
-        <a:latin typeface="+mn-lt"/>
-        <a:ea typeface="+mn-ea"/>
-        <a:cs typeface="+mn-cs"/>
-      </a:defRPr>
-    </a:lvl6pPr>
-    <a:lvl7pPr marL="2743200" algn="l" defTabSz="914400" rtl="0" eaLnBrk="1" latinLnBrk="0" hangingPunct="1">
-      <a:defRPr sz="1200" kern="1200">
-        <a:solidFill>
-          <a:schemeClr val="tx1"/>
-        </a:solidFill>
-        <a:latin typeface="+mn-lt"/>
-        <a:ea typeface="+mn-ea"/>
-        <a:cs typeface="+mn-cs"/>
-      </a:defRPr>
-    </a:lvl7pPr>
-    <a:lvl8pPr marL="3200400" algn="l" defTabSz="914400" rtl="0" eaLnBrk="1" latinLnBrk="0" hangingPunct="1">
-      <a:defRPr sz="1200" kern="1200">
-        <a:solidFill>
-          <a:schemeClr val="tx1"/>
-        </a:solidFill>
-        <a:latin typeface="+mn-lt"/>
-        <a:ea typeface="+mn-ea"/>
-        <a:cs typeface="+mn-cs"/>
-      </a:defRPr>
-    </a:lvl8pPr>
-    <a:lvl9pPr marL="3657600" algn="l" defTabSz="914400" rtl="0" eaLnBrk="1" latinLnBrk="0" hangingPunct="1">
-      <a:defRPr sz="1200" kern="1200">
-        <a:solidFill>
-          <a:schemeClr val="tx1"/>
-        </a:solidFill>
-        <a:latin typeface="+mn-lt"/>
-        <a:ea typeface="+mn-ea"/>
-        <a:cs typeface="+mn-cs"/>
-      </a:defRPr>
-    </a:lvl9pPr>
-  </p:notesStyle>
-</p:notesMaster>
-</file>
-
-<file path=ppt/notesSlides/notesSlide1.xml><?xml version="1.0" encoding="utf-8"?>
-<p:notes xmlns:a="http://schemas.openxmlformats.org/drawingml/2006/main" xmlns:r="http://schemas.openxmlformats.org/officeDocument/2006/relationships" xmlns:p="http://schemas.openxmlformats.org/presentationml/2006/main">
-  <p:cSld>
-    <p:spTree>
-      <p:nvGrpSpPr>
-        <p:cNvPr id="1" name=""/>
-        <p:cNvGrpSpPr/>
-        <p:nvPr/>
-      </p:nvGrpSpPr>
-      <p:grpSpPr>
-        <a:xfrm>
-          <a:off x="0" y="0"/>
-          <a:ext cx="0" cy="0"/>
-          <a:chOff x="0" y="0"/>
-          <a:chExt cx="0" cy="0"/>
-        </a:xfrm>
-      </p:grpSpPr>
-      <p:sp>
-        <p:nvSpPr>
-          <p:cNvPr id="2" name="Slide Image Placeholder 1"/>
-          <p:cNvSpPr>
-            <a:spLocks noGrp="1" noRot="1" noChangeAspect="1"/>
-          </p:cNvSpPr>
-          <p:nvPr>
-            <p:ph type="sldImg"/>
-          </p:nvPr>
-        </p:nvSpPr>
-        <p:spPr/>
-      </p:sp>
-      <p:sp>
-        <p:nvSpPr>
-          <p:cNvPr id="3" name="Notes Placeholder 2"/>
-          <p:cNvSpPr>
-            <a:spLocks noGrp="1"/>
-          </p:cNvSpPr>
-          <p:nvPr>
-            <p:ph type="body" idx="1"/>
-          </p:nvPr>
-        </p:nvSpPr>
-        <p:spPr/>
-        <p:txBody>
-          <a:bodyPr/>
-          <a:lstStyle/>
-          <a:p>
-            <a:pPr lvl="0" indent="0" marL="0">
-              <a:buNone/>
-            </a:pPr>
-            <a:r>
-              <a:rPr/>
-              <a:t>Speaker notes go here.</a:t>
-            </a:r>
-          </a:p>
-        </p:txBody>
-      </p:sp>
-      <p:sp>
-        <p:nvSpPr>
-          <p:cNvPr id="4" name="Slide Number Placeholder 3"/>
-          <p:cNvSpPr>
-            <a:spLocks noGrp="1"/>
-          </p:cNvSpPr>
-          <p:nvPr>
-            <p:ph type="sldNum" sz="quarter" idx="10"/>
-          </p:nvPr>
-        </p:nvSpPr>
-        <p:spPr/>
-        <p:txBody>
-          <a:bodyPr/>
-          <a:lstStyle/>
-          <a:p>
-            <a:fld id="{18BDFEC3-8487-43E8-A154-7C12CBC1FFF2}" type="slidenum">
-              <a:rPr lang="en-US"/>
-              <a:t>2</a:t>
-            </a:fld>
-            <a:endParaRPr lang="en-US"/>
-          </a:p>
-        </p:txBody>
-      </p:sp>
-    </p:spTree>
-  </p:cSld>
-</p:notes>
 </file>
 
 <file path=ppt/slideLayouts/slideLayout1.xml><?xml version="1.0" encoding="utf-8"?>
@@ -3669,35 +3236,21 @@
             </a:pPr>
             <a:r>
               <a:rPr b="1"/>
-              <a:t>四个模块</a:t>
+              <a:t>项目驱动</a:t>
             </a:r>
           </a:p>
           <a:p>
             <a:pPr lvl="0"/>
             <a:r>
               <a:rPr/>
-              <a:t>环境搭建模块：在自己的电脑中搭建数据分析环境</a:t>
+              <a:t>每次课程围绕一个独立但相互关联的项目展开</a:t>
             </a:r>
           </a:p>
           <a:p>
             <a:pPr lvl="0"/>
             <a:r>
               <a:rPr/>
-              <a:t>数据分析模块：使用 R 进行数据分析和可视化的基本操作</a:t>
-            </a:r>
-          </a:p>
-          <a:p>
-            <a:pPr lvl="0"/>
-            <a:r>
-              <a:rPr/>
-              <a:t>人工智能模块：借助人工智能工具进行数据分析</a:t>
-            </a:r>
-          </a:p>
-          <a:p>
-            <a:pPr lvl="0"/>
-            <a:r>
-              <a:rPr/>
-              <a:t>开发协作模块：与全世界开发者协作，开发自己的软件包</a:t>
+              <a:t>所有项目可分为 4 个模块</a:t>
             </a:r>
           </a:p>
         </p:txBody>
@@ -3726,12 +3279,12 @@
       </p:grpSpPr>
       <p:sp>
         <p:nvSpPr>
-          <p:cNvPr id="2" name="Title 1"/>
-          <p:cNvSpPr>
-            <a:spLocks noGrp="1"/>
-          </p:cNvSpPr>
-          <p:nvPr>
-            <p:ph type="title"/>
+          <p:cNvPr id="3" name="Content Placeholder 2"/>
+          <p:cNvSpPr>
+            <a:spLocks noGrp="1"/>
+          </p:cNvSpPr>
+          <p:nvPr>
+            <p:ph idx="1"/>
           </p:nvPr>
         </p:nvSpPr>
         <p:spPr/>
@@ -3740,45 +3293,42 @@
           <a:lstStyle/>
           <a:p>
             <a:pPr lvl="0" indent="0" marL="0">
-              <a:buNone/>
-            </a:pPr>
-            <a:r>
-              <a:rPr/>
-              <a:t>课程项目一览</a:t>
-            </a:r>
-          </a:p>
-        </p:txBody>
-      </p:sp>
-      <p:sp>
-        <p:nvSpPr>
-          <p:cNvPr id="3" name="Content Placeholder 2"/>
-          <p:cNvSpPr>
-            <a:spLocks noGrp="1"/>
-          </p:cNvSpPr>
-          <p:nvPr>
-            <p:ph idx="1"/>
-          </p:nvPr>
-        </p:nvSpPr>
-        <p:spPr/>
-        <p:txBody>
-          <a:bodyPr/>
-          <a:lstStyle/>
-          <a:p>
-            <a:pPr lvl="0" indent="0" marL="1270000">
-              <a:buNone/>
-            </a:pPr>
-            <a:r>
-              <a:rPr sz="2000" b="1"/>
-              <a:t>Note</a:t>
-            </a:r>
-          </a:p>
-          <a:p>
-            <a:pPr lvl="0" indent="0" marL="1270000">
-              <a:buNone/>
-            </a:pPr>
-            <a:r>
-              <a:rPr sz="2000"/>
-              <a:t>项目内容及讲授顺序会根据实际情况进行调整。</a:t>
+              <a:spcBef>
+                <a:spcPts val="3000"/>
+              </a:spcBef>
+              <a:buNone/>
+            </a:pPr>
+            <a:r>
+              <a:rPr b="1"/>
+              <a:t>四个模块</a:t>
+            </a:r>
+          </a:p>
+          <a:p>
+            <a:pPr lvl="0"/>
+            <a:r>
+              <a:rPr/>
+              <a:t>环境搭建模块：在自己的电脑中搭建数据分析环境</a:t>
+            </a:r>
+          </a:p>
+          <a:p>
+            <a:pPr lvl="0"/>
+            <a:r>
+              <a:rPr/>
+              <a:t>数据采集模块：使用 R 进行数据分析和可视化的基本操作</a:t>
+            </a:r>
+          </a:p>
+          <a:p>
+            <a:pPr lvl="0"/>
+            <a:r>
+              <a:rPr/>
+              <a:t>数据预处理模块：借助人工智能工具进行数据分析</a:t>
+            </a:r>
+          </a:p>
+          <a:p>
+            <a:pPr lvl="0"/>
+            <a:r>
+              <a:rPr/>
+              <a:t>实践模块：与全世界开发者协作，开发自己的软件包</a:t>
             </a:r>
           </a:p>
         </p:txBody>
@@ -3807,6 +3357,31 @@
       </p:grpSpPr>
       <p:sp>
         <p:nvSpPr>
+          <p:cNvPr id="2" name="Title 1"/>
+          <p:cNvSpPr>
+            <a:spLocks noGrp="1"/>
+          </p:cNvSpPr>
+          <p:nvPr>
+            <p:ph type="title"/>
+          </p:nvPr>
+        </p:nvSpPr>
+        <p:spPr/>
+        <p:txBody>
+          <a:bodyPr/>
+          <a:lstStyle/>
+          <a:p>
+            <a:pPr lvl="0" indent="0" marL="0">
+              <a:buNone/>
+            </a:pPr>
+            <a:r>
+              <a:rPr/>
+              <a:t>课程项目一览</a:t>
+            </a:r>
+          </a:p>
+        </p:txBody>
+      </p:sp>
+      <p:sp>
+        <p:nvSpPr>
           <p:cNvPr id="3" name="Content Placeholder 2"/>
           <p:cNvSpPr>
             <a:spLocks noGrp="1"/>
@@ -3820,51 +3395,21 @@
           <a:bodyPr/>
           <a:lstStyle/>
           <a:p>
-            <a:pPr lvl="0" indent="0" marL="0">
-              <a:spcBef>
-                <a:spcPts val="3000"/>
-              </a:spcBef>
-              <a:buNone/>
-            </a:pPr>
-            <a:r>
-              <a:rPr b="1"/>
-              <a:t>环境搭建模块</a:t>
-            </a:r>
-          </a:p>
-          <a:p>
-            <a:pPr lvl="0" indent="0" marL="0">
-              <a:buNone/>
-            </a:pPr>
-            <a:r>
-              <a:rPr/>
-              <a:t>环境搭建模块的项目内容包括：</a:t>
-            </a:r>
-          </a:p>
-          <a:p>
-            <a:pPr lvl="0" indent="-342900" marL="342900">
-              <a:buAutoNum type="arabicPeriod"/>
-            </a:pPr>
-            <a:r>
-              <a:rPr/>
-              <a:t>电脑硬件和操作系统</a:t>
-            </a:r>
-          </a:p>
-          <a:p>
-            <a:pPr lvl="0" indent="-342900" marL="342900">
-              <a:buAutoNum type="arabicPeriod"/>
-            </a:pPr>
-            <a:r>
-              <a:rPr/>
-              <a:t>可重复的数据分析环境</a:t>
-            </a:r>
-          </a:p>
-          <a:p>
-            <a:pPr lvl="0" indent="-342900" marL="342900">
-              <a:buAutoNum type="arabicPeriod"/>
-            </a:pPr>
-            <a:r>
-              <a:rPr/>
-              <a:t>现代工具链</a:t>
+            <a:pPr lvl="0" indent="0" marL="1270000">
+              <a:buNone/>
+            </a:pPr>
+            <a:r>
+              <a:rPr sz="2000" b="1"/>
+              <a:t>Note</a:t>
+            </a:r>
+          </a:p>
+          <a:p>
+            <a:pPr lvl="0" indent="0" marL="1270000">
+              <a:buNone/>
+            </a:pPr>
+            <a:r>
+              <a:rPr sz="2000"/>
+              <a:t>项目内容及讲授顺序会根据实际情况进行调整。</a:t>
             </a:r>
           </a:p>
         </p:txBody>
@@ -3914,7 +3459,7 @@
             </a:pPr>
             <a:r>
               <a:rPr b="1"/>
-              <a:t>数据分析模块</a:t>
+              <a:t>环境搭建模块</a:t>
             </a:r>
           </a:p>
           <a:p>
@@ -3923,34 +3468,34 @@
             </a:pPr>
             <a:r>
               <a:rPr/>
-              <a:t>数据分析模块的项目内容包括：</a:t>
+              <a:t>环境搭建模块的项目内容包括：</a:t>
             </a:r>
           </a:p>
           <a:p>
             <a:pPr lvl="0" indent="-342900" marL="342900">
-              <a:buAutoNum startAt="4" type="arabicPeriod"/>
-            </a:pPr>
-            <a:r>
-              <a:rPr/>
-              <a:t>分组数据统计分析和可视化</a:t>
+              <a:buAutoNum type="arabicPeriod"/>
+            </a:pPr>
+            <a:r>
+              <a:rPr/>
+              <a:t>电脑硬件和操作系统</a:t>
             </a:r>
           </a:p>
           <a:p>
             <a:pPr lvl="0" indent="-342900" marL="342900">
-              <a:buAutoNum startAt="4" type="arabicPeriod"/>
-            </a:pPr>
-            <a:r>
-              <a:rPr/>
-              <a:t>转录组学数据分析和可视化</a:t>
+              <a:buAutoNum type="arabicPeriod"/>
+            </a:pPr>
+            <a:r>
+              <a:rPr/>
+              <a:t>可重复的数据分析环境</a:t>
             </a:r>
           </a:p>
           <a:p>
             <a:pPr lvl="0" indent="-342900" marL="342900">
-              <a:buAutoNum startAt="4" type="arabicPeriod"/>
-            </a:pPr>
-            <a:r>
-              <a:rPr/>
-              <a:t>微生物组数据分析及可视化</a:t>
+              <a:buAutoNum type="arabicPeriod"/>
+            </a:pPr>
+            <a:r>
+              <a:rPr/>
+              <a:t>现代工具链</a:t>
             </a:r>
           </a:p>
         </p:txBody>
@@ -4000,7 +3545,7 @@
             </a:pPr>
             <a:r>
               <a:rPr b="1"/>
-              <a:t>人工智能模块</a:t>
+              <a:t>数据分析模块</a:t>
             </a:r>
           </a:p>
           <a:p>
@@ -4009,52 +3554,34 @@
             </a:pPr>
             <a:r>
               <a:rPr/>
-              <a:t>人工智能模块的项目内容包括：</a:t>
+              <a:t>数据分析模块的项目内容包括：</a:t>
             </a:r>
           </a:p>
           <a:p>
             <a:pPr lvl="0" indent="-342900" marL="342900">
-              <a:buAutoNum startAt="7" type="arabicPeriod"/>
-            </a:pPr>
-            <a:r>
-              <a:rPr/>
-              <a:t>调用通用大语言模型执行任务</a:t>
+              <a:buAutoNum startAt="4" type="arabicPeriod"/>
+            </a:pPr>
+            <a:r>
+              <a:rPr/>
+              <a:t>分组数据统计分析和可视化</a:t>
             </a:r>
           </a:p>
           <a:p>
             <a:pPr lvl="0" indent="-342900" marL="342900">
-              <a:buAutoNum startAt="7" type="arabicPeriod"/>
-            </a:pPr>
-            <a:r>
-              <a:rPr/>
-              <a:t>机器学习算法及实现</a:t>
+              <a:buAutoNum startAt="4" type="arabicPeriod"/>
+            </a:pPr>
+            <a:r>
+              <a:rPr/>
+              <a:t>转录组学数据分析和可视化</a:t>
             </a:r>
           </a:p>
           <a:p>
             <a:pPr lvl="0" indent="-342900" marL="342900">
-              <a:buAutoNum startAt="7" type="arabicPeriod"/>
-            </a:pPr>
-            <a:r>
-              <a:rPr/>
-              <a:t>手搓神经网络模型</a:t>
-            </a:r>
-          </a:p>
-          <a:p>
-            <a:pPr lvl="0" indent="-342900" marL="342900">
-              <a:buAutoNum startAt="7" type="arabicPeriod"/>
-            </a:pPr>
-            <a:r>
-              <a:rPr/>
-              <a:t>利用拉曼光谱识别病原菌</a:t>
-            </a:r>
-          </a:p>
-          <a:p>
-            <a:pPr lvl="0" indent="-342900" marL="342900">
-              <a:buAutoNum startAt="7" type="arabicPeriod"/>
-            </a:pPr>
-            <a:r>
-              <a:rPr/>
-              <a:t>计算机视觉辅助分析实验图片</a:t>
+              <a:buAutoNum startAt="4" type="arabicPeriod"/>
+            </a:pPr>
+            <a:r>
+              <a:rPr/>
+              <a:t>微生物组数据分析及可视化</a:t>
             </a:r>
           </a:p>
         </p:txBody>
@@ -4104,7 +3631,7 @@
             </a:pPr>
             <a:r>
               <a:rPr b="1"/>
-              <a:t>开发协作模块</a:t>
+              <a:t>人工智能模块</a:t>
             </a:r>
           </a:p>
           <a:p>
@@ -4113,25 +3640,52 @@
             </a:pPr>
             <a:r>
               <a:rPr/>
-              <a:t>开发协作模块的项目内容包括：</a:t>
+              <a:t>人工智能模块的项目内容包括：</a:t>
             </a:r>
           </a:p>
           <a:p>
             <a:pPr lvl="0" indent="-342900" marL="342900">
-              <a:buAutoNum startAt="12" type="arabicPeriod"/>
-            </a:pPr>
-            <a:r>
-              <a:rPr/>
-              <a:t>与全世界开发者协作</a:t>
+              <a:buAutoNum startAt="7" type="arabicPeriod"/>
+            </a:pPr>
+            <a:r>
+              <a:rPr/>
+              <a:t>调用通用大语言模型执行任务</a:t>
             </a:r>
           </a:p>
           <a:p>
             <a:pPr lvl="0" indent="-342900" marL="342900">
-              <a:buAutoNum startAt="12" type="arabicPeriod"/>
-            </a:pPr>
-            <a:r>
-              <a:rPr/>
-              <a:t>开发 R 包</a:t>
+              <a:buAutoNum startAt="7" type="arabicPeriod"/>
+            </a:pPr>
+            <a:r>
+              <a:rPr/>
+              <a:t>机器学习算法及实现</a:t>
+            </a:r>
+          </a:p>
+          <a:p>
+            <a:pPr lvl="0" indent="-342900" marL="342900">
+              <a:buAutoNum startAt="7" type="arabicPeriod"/>
+            </a:pPr>
+            <a:r>
+              <a:rPr/>
+              <a:t>手搓神经网络模型</a:t>
+            </a:r>
+          </a:p>
+          <a:p>
+            <a:pPr lvl="0" indent="-342900" marL="342900">
+              <a:buAutoNum startAt="7" type="arabicPeriod"/>
+            </a:pPr>
+            <a:r>
+              <a:rPr/>
+              <a:t>利用拉曼光谱识别病原菌</a:t>
+            </a:r>
+          </a:p>
+          <a:p>
+            <a:pPr lvl="0" indent="-342900" marL="342900">
+              <a:buAutoNum startAt="7" type="arabicPeriod"/>
+            </a:pPr>
+            <a:r>
+              <a:rPr/>
+              <a:t>计算机视觉辅助分析实验图片</a:t>
             </a:r>
           </a:p>
         </p:txBody>
@@ -4160,12 +3714,12 @@
       </p:grpSpPr>
       <p:sp>
         <p:nvSpPr>
-          <p:cNvPr id="2" name="Title 1"/>
-          <p:cNvSpPr>
-            <a:spLocks noGrp="1"/>
-          </p:cNvSpPr>
-          <p:nvPr>
-            <p:ph type="title"/>
+          <p:cNvPr id="3" name="Content Placeholder 2"/>
+          <p:cNvSpPr>
+            <a:spLocks noGrp="1"/>
+          </p:cNvSpPr>
+          <p:nvPr>
+            <p:ph idx="1"/>
           </p:nvPr>
         </p:nvSpPr>
         <p:spPr/>
@@ -4174,45 +3728,41 @@
           <a:lstStyle/>
           <a:p>
             <a:pPr lvl="0" indent="0" marL="0">
-              <a:buNone/>
-            </a:pPr>
-            <a:r>
-              <a:rPr/>
-              <a:t>课程大纲</a:t>
-            </a:r>
-          </a:p>
-        </p:txBody>
-      </p:sp>
-      <p:sp>
-        <p:nvSpPr>
-          <p:cNvPr id="3" name="Content Placeholder 2"/>
-          <p:cNvSpPr>
-            <a:spLocks noGrp="1"/>
-          </p:cNvSpPr>
-          <p:nvPr>
-            <p:ph idx="1"/>
-          </p:nvPr>
-        </p:nvSpPr>
-        <p:spPr/>
-        <p:txBody>
-          <a:bodyPr/>
-          <a:lstStyle/>
-          <a:p>
-            <a:pPr lvl="0" indent="0" marL="1270000">
-              <a:buNone/>
-            </a:pPr>
-            <a:r>
-              <a:rPr sz="2000" b="1"/>
-              <a:t>Note</a:t>
-            </a:r>
-          </a:p>
-          <a:p>
-            <a:pPr lvl="0" indent="0" marL="1270000">
-              <a:buNone/>
-            </a:pPr>
-            <a:r>
-              <a:rPr sz="2000"/>
-              <a:t>课程大纲及讲授内容会根据实际情况进行调整。</a:t>
+              <a:spcBef>
+                <a:spcPts val="3000"/>
+              </a:spcBef>
+              <a:buNone/>
+            </a:pPr>
+            <a:r>
+              <a:rPr b="1"/>
+              <a:t>开发协作模块</a:t>
+            </a:r>
+          </a:p>
+          <a:p>
+            <a:pPr lvl="0" indent="0" marL="0">
+              <a:buNone/>
+            </a:pPr>
+            <a:r>
+              <a:rPr/>
+              <a:t>开发协作模块的项目内容包括：</a:t>
+            </a:r>
+          </a:p>
+          <a:p>
+            <a:pPr lvl="0" indent="-342900" marL="342900">
+              <a:buAutoNum startAt="12" type="arabicPeriod"/>
+            </a:pPr>
+            <a:r>
+              <a:rPr/>
+              <a:t>与全世界开发者协作</a:t>
+            </a:r>
+          </a:p>
+          <a:p>
+            <a:pPr lvl="0" indent="-342900" marL="342900">
+              <a:buAutoNum startAt="12" type="arabicPeriod"/>
+            </a:pPr>
+            <a:r>
+              <a:rPr/>
+              <a:t>开发 R 包</a:t>
             </a:r>
           </a:p>
         </p:txBody>
@@ -4241,6 +3791,31 @@
       </p:grpSpPr>
       <p:sp>
         <p:nvSpPr>
+          <p:cNvPr id="2" name="Title 1"/>
+          <p:cNvSpPr>
+            <a:spLocks noGrp="1"/>
+          </p:cNvSpPr>
+          <p:nvPr>
+            <p:ph type="title"/>
+          </p:nvPr>
+        </p:nvSpPr>
+        <p:spPr/>
+        <p:txBody>
+          <a:bodyPr/>
+          <a:lstStyle/>
+          <a:p>
+            <a:pPr lvl="0" indent="0" marL="0">
+              <a:buNone/>
+            </a:pPr>
+            <a:r>
+              <a:rPr/>
+              <a:t>课程大纲</a:t>
+            </a:r>
+          </a:p>
+        </p:txBody>
+      </p:sp>
+      <p:sp>
+        <p:nvSpPr>
           <p:cNvPr id="3" name="Content Placeholder 2"/>
           <p:cNvSpPr>
             <a:spLocks noGrp="1"/>
@@ -4254,161 +3829,21 @@
           <a:bodyPr/>
           <a:lstStyle/>
           <a:p>
-            <a:pPr lvl="0" indent="0" marL="0">
-              <a:spcBef>
-                <a:spcPts val="3000"/>
-              </a:spcBef>
-              <a:buNone/>
-            </a:pPr>
-            <a:r>
-              <a:rPr b="1"/>
-              <a:t>环境搭建模块</a:t>
-            </a:r>
-          </a:p>
-          <a:p>
-            <a:pPr lvl="0" indent="-342900" marL="342900">
-              <a:buAutoNum type="arabicPeriod"/>
-            </a:pPr>
-            <a:r>
-              <a:rPr b="1"/>
-              <a:t>电脑硬件和操作系统</a:t>
-            </a:r>
-            <a:r>
-              <a:rPr/>
-              <a:t>【自备】</a:t>
-            </a:r>
-          </a:p>
-          <a:p>
-            <a:pPr lvl="1"/>
-            <a:r>
-              <a:rPr/>
-              <a:t>推荐使用 Linux/WSL 系统</a:t>
-            </a:r>
-          </a:p>
-          <a:p>
-            <a:pPr lvl="0" indent="-342900" marL="342900">
-              <a:buAutoNum type="arabicPeriod"/>
-            </a:pPr>
-            <a:r>
-              <a:rPr b="1"/>
-              <a:t>可重复的数据分析环境</a:t>
-            </a:r>
-          </a:p>
-          <a:p>
-            <a:pPr lvl="1"/>
-            <a:r>
-              <a:rPr/>
-              <a:t>安装脚本语言工具 </a:t>
-            </a:r>
-            <a:r>
-              <a:rPr>
-                <a:latin typeface="Courier"/>
-              </a:rPr>
-              <a:t>R</a:t>
-            </a:r>
-            <a:r>
-              <a:rPr/>
-              <a:t> &amp; </a:t>
-            </a:r>
-            <a:r>
-              <a:rPr>
-                <a:latin typeface="Courier"/>
-              </a:rPr>
-              <a:t>RStudio</a:t>
-            </a:r>
-          </a:p>
-          <a:p>
-            <a:pPr lvl="1"/>
-            <a:r>
-              <a:rPr/>
-              <a:t>安装 </a:t>
-            </a:r>
-            <a:r>
-              <a:rPr>
-                <a:latin typeface="Courier"/>
-              </a:rPr>
-              <a:t>tidyverse</a:t>
-            </a:r>
-            <a:r>
-              <a:rPr/>
-              <a:t>、</a:t>
-            </a:r>
-            <a:r>
-              <a:rPr>
-                <a:latin typeface="Courier"/>
-              </a:rPr>
-              <a:t>ggpubr</a:t>
-            </a:r>
-            <a:r>
-              <a:rPr/>
-              <a:t> 等 R 包</a:t>
-            </a:r>
-          </a:p>
-          <a:p>
-            <a:pPr lvl="1"/>
-            <a:r>
-              <a:rPr/>
-              <a:t>安装 </a:t>
-            </a:r>
-            <a:r>
-              <a:rPr>
-                <a:latin typeface="Courier"/>
-              </a:rPr>
-              <a:t>Conda</a:t>
-            </a:r>
-            <a:r>
-              <a:rPr/>
-              <a:t> &amp; </a:t>
-            </a:r>
-            <a:r>
-              <a:rPr>
-                <a:latin typeface="Courier"/>
-              </a:rPr>
-              <a:t>Python</a:t>
-            </a:r>
-          </a:p>
-          <a:p>
-            <a:pPr lvl="1"/>
-            <a:r>
-              <a:rPr/>
-              <a:t>安装 </a:t>
-            </a:r>
-            <a:r>
-              <a:rPr>
-                <a:latin typeface="Courier"/>
-              </a:rPr>
-              <a:t>Git</a:t>
-            </a:r>
-            <a:r>
-              <a:rPr/>
-              <a:t>，注册 </a:t>
-            </a:r>
-            <a:r>
-              <a:rPr>
-                <a:latin typeface="Courier"/>
-              </a:rPr>
-              <a:t>GitHub</a:t>
-            </a:r>
-            <a:r>
-              <a:rPr/>
-              <a:t>/</a:t>
-            </a:r>
-            <a:r>
-              <a:rPr>
-                <a:latin typeface="Courier"/>
-              </a:rPr>
-              <a:t>Gitee</a:t>
-            </a:r>
-            <a:r>
-              <a:rPr/>
-              <a:t> 账号</a:t>
-            </a:r>
-          </a:p>
-          <a:p>
-            <a:pPr lvl="1"/>
-            <a:r>
-              <a:rPr/>
-              <a:t>安装 VSCode、JupyterLab、Quarto 等工具</a:t>
+            <a:pPr lvl="0" indent="0" marL="1270000">
+              <a:buNone/>
+            </a:pPr>
+            <a:r>
+              <a:rPr sz="2000" b="1"/>
+              <a:t>Note</a:t>
+            </a:r>
+          </a:p>
+          <a:p>
+            <a:pPr lvl="0" indent="0" marL="1270000">
+              <a:buNone/>
+            </a:pPr>
+            <a:r>
+              <a:rPr sz="2000"/>
+              <a:t>课程大纲及讲授内容会根据实际情况进行调整。</a:t>
             </a:r>
           </a:p>
         </p:txBody>
@@ -4450,47 +3885,161 @@
           <a:bodyPr/>
           <a:lstStyle/>
           <a:p>
+            <a:pPr lvl="0" indent="0" marL="0">
+              <a:spcBef>
+                <a:spcPts val="3000"/>
+              </a:spcBef>
+              <a:buNone/>
+            </a:pPr>
+            <a:r>
+              <a:rPr b="1"/>
+              <a:t>环境搭建模块</a:t>
+            </a:r>
+          </a:p>
+          <a:p>
             <a:pPr lvl="0" indent="-342900" marL="342900">
-              <a:buAutoNum startAt="3" type="arabicPeriod"/>
+              <a:buAutoNum type="arabicPeriod"/>
             </a:pPr>
             <a:r>
               <a:rPr b="1"/>
-              <a:t>现代工具链</a:t>
+              <a:t>电脑硬件和操作系统</a:t>
+            </a:r>
+            <a:r>
+              <a:rPr/>
+              <a:t>【自备】</a:t>
             </a:r>
           </a:p>
           <a:p>
             <a:pPr lvl="1"/>
             <a:r>
               <a:rPr/>
-              <a:t>Markdown 和 Latex</a:t>
+              <a:t>推荐使用 Linux/WSL 系统</a:t>
+            </a:r>
+          </a:p>
+          <a:p>
+            <a:pPr lvl="0" indent="-342900" marL="342900">
+              <a:buAutoNum type="arabicPeriod"/>
+            </a:pPr>
+            <a:r>
+              <a:rPr b="1"/>
+              <a:t>可重复的数据分析环境</a:t>
             </a:r>
           </a:p>
           <a:p>
             <a:pPr lvl="1"/>
             <a:r>
               <a:rPr/>
-              <a:t>R Markdown 和 JupyterLab</a:t>
+              <a:t>安装脚本语言工具 </a:t>
+            </a:r>
+            <a:r>
+              <a:rPr>
+                <a:latin typeface="Courier"/>
+              </a:rPr>
+              <a:t>R</a:t>
+            </a:r>
+            <a:r>
+              <a:rPr/>
+              <a:t> &amp; </a:t>
+            </a:r>
+            <a:r>
+              <a:rPr>
+                <a:latin typeface="Courier"/>
+              </a:rPr>
+              <a:t>RStudio</a:t>
             </a:r>
           </a:p>
           <a:p>
             <a:pPr lvl="1"/>
             <a:r>
               <a:rPr/>
-              <a:t>Quarto 文档</a:t>
+              <a:t>安装 </a:t>
+            </a:r>
+            <a:r>
+              <a:rPr>
+                <a:latin typeface="Courier"/>
+              </a:rPr>
+              <a:t>tidyverse</a:t>
+            </a:r>
+            <a:r>
+              <a:rPr/>
+              <a:t>、</a:t>
+            </a:r>
+            <a:r>
+              <a:rPr>
+                <a:latin typeface="Courier"/>
+              </a:rPr>
+              <a:t>ggpubr</a:t>
+            </a:r>
+            <a:r>
+              <a:rPr/>
+              <a:t> 等 R 包</a:t>
             </a:r>
           </a:p>
           <a:p>
             <a:pPr lvl="1"/>
             <a:r>
               <a:rPr/>
-              <a:t>Git 和 GitHub/Gitee</a:t>
+              <a:t>安装 </a:t>
+            </a:r>
+            <a:r>
+              <a:rPr>
+                <a:latin typeface="Courier"/>
+              </a:rPr>
+              <a:t>Conda</a:t>
+            </a:r>
+            <a:r>
+              <a:rPr/>
+              <a:t> &amp; </a:t>
+            </a:r>
+            <a:r>
+              <a:rPr>
+                <a:latin typeface="Courier"/>
+              </a:rPr>
+              <a:t>Python</a:t>
             </a:r>
           </a:p>
           <a:p>
             <a:pPr lvl="1"/>
             <a:r>
               <a:rPr/>
-              <a:t>AI 代码编辑器</a:t>
+              <a:t>安装 </a:t>
+            </a:r>
+            <a:r>
+              <a:rPr>
+                <a:latin typeface="Courier"/>
+              </a:rPr>
+              <a:t>Git</a:t>
+            </a:r>
+            <a:r>
+              <a:rPr/>
+              <a:t>，注册 </a:t>
+            </a:r>
+            <a:r>
+              <a:rPr>
+                <a:latin typeface="Courier"/>
+              </a:rPr>
+              <a:t>GitHub</a:t>
+            </a:r>
+            <a:r>
+              <a:rPr/>
+              <a:t>/</a:t>
+            </a:r>
+            <a:r>
+              <a:rPr>
+                <a:latin typeface="Courier"/>
+              </a:rPr>
+              <a:t>Gitee</a:t>
+            </a:r>
+            <a:r>
+              <a:rPr/>
+              <a:t> 账号</a:t>
+            </a:r>
+          </a:p>
+          <a:p>
+            <a:pPr lvl="1"/>
+            <a:r>
+              <a:rPr/>
+              <a:t>安装 VSCode、JupyterLab、Quarto 等工具</a:t>
             </a:r>
           </a:p>
         </p:txBody>
@@ -4532,80 +4081,47 @@
           <a:bodyPr/>
           <a:lstStyle/>
           <a:p>
-            <a:pPr lvl="0" indent="0" marL="0">
-              <a:spcBef>
-                <a:spcPts val="3000"/>
-              </a:spcBef>
-              <a:buNone/>
+            <a:pPr lvl="0" indent="-342900" marL="342900">
+              <a:buAutoNum startAt="3" type="arabicPeriod"/>
             </a:pPr>
             <a:r>
               <a:rPr b="1"/>
-              <a:t>数据分析模块</a:t>
-            </a:r>
-          </a:p>
-          <a:p>
-            <a:pPr lvl="0" indent="-342900" marL="342900">
-              <a:buAutoNum startAt="4" type="arabicPeriod"/>
-            </a:pPr>
-            <a:r>
-              <a:rPr b="1"/>
-              <a:t>分组数据统计分析和可视化</a:t>
-            </a:r>
-          </a:p>
-          <a:p>
-            <a:pPr lvl="1" indent="0" marL="342900">
-              <a:buNone/>
-            </a:pPr>
-            <a:r>
-              <a:rPr/>
-              <a:t>以 2021 年发表在 ISME J 的论文为例，讲解统计分析和可视化的方法 (Gao, Cao, Cai, et al. 2021)。</a:t>
+              <a:t>现代工具链</a:t>
             </a:r>
           </a:p>
           <a:p>
             <a:pPr lvl="1"/>
             <a:r>
-              <a:rPr>
-                <a:latin typeface="Courier"/>
-              </a:rPr>
-              <a:t>ggplot2</a:t>
-            </a:r>
-            <a:r>
-              <a:rPr/>
-              <a:t> 软件包及图形语法</a:t>
+              <a:rPr/>
+              <a:t>Markdown 和 Latex</a:t>
             </a:r>
           </a:p>
           <a:p>
             <a:pPr lvl="1"/>
             <a:r>
               <a:rPr/>
-              <a:t>统计分析的数学基础</a:t>
+              <a:t>R Markdown 和 JupyterLab</a:t>
             </a:r>
           </a:p>
           <a:p>
             <a:pPr lvl="1"/>
             <a:r>
               <a:rPr/>
-              <a:t>示例数据集的介绍</a:t>
+              <a:t>Quarto 文档</a:t>
             </a:r>
           </a:p>
           <a:p>
             <a:pPr lvl="1"/>
             <a:r>
-              <a:rPr>
-                <a:latin typeface="Courier"/>
-              </a:rPr>
-              <a:t>ggpubr</a:t>
-            </a:r>
-            <a:r>
-              <a:rPr/>
-              <a:t> 软件包的应用</a:t>
+              <a:rPr/>
+              <a:t>Git 和 GitHub/Gitee</a:t>
             </a:r>
           </a:p>
           <a:p>
             <a:pPr lvl="1"/>
             <a:r>
               <a:rPr/>
-              <a:t>分组比对、统计和可视化</a:t>
+              <a:t>AI 代码编辑器</a:t>
             </a:r>
           </a:p>
         </p:txBody>
@@ -4719,12 +4235,24 @@
           <a:bodyPr/>
           <a:lstStyle/>
           <a:p>
+            <a:pPr lvl="0" indent="0" marL="0">
+              <a:spcBef>
+                <a:spcPts val="3000"/>
+              </a:spcBef>
+              <a:buNone/>
+            </a:pPr>
+            <a:r>
+              <a:rPr b="1"/>
+              <a:t>数据分析模块</a:t>
+            </a:r>
+          </a:p>
+          <a:p>
             <a:pPr lvl="0" indent="-342900" marL="342900">
-              <a:buAutoNum startAt="5" type="arabicPeriod"/>
+              <a:buAutoNum startAt="4" type="arabicPeriod"/>
             </a:pPr>
             <a:r>
               <a:rPr b="1"/>
-              <a:t>转录组学数据分析和可视化</a:t>
+              <a:t>分组数据统计分析和可视化</a:t>
             </a:r>
           </a:p>
           <a:p>
@@ -4733,14 +4261,7 @@
             </a:pPr>
             <a:r>
               <a:rPr/>
-              <a:t>以 2021 年发表在 ISME Communications 的论文为例，讲解转录组学数据分析和可视化的方法 (Gao, Cao, Ju, et al. 2021)。</a:t>
-            </a:r>
-          </a:p>
-          <a:p>
-            <a:pPr lvl="1"/>
-            <a:r>
-              <a:rPr/>
-              <a:t>转录组学分析的基本原理</a:t>
+              <a:t>以 2021 年发表在 ISME J 的论文为例，讲解统计分析和可视化的方法 (Gao, Cao, Cai, et al. 2021)。</a:t>
             </a:r>
           </a:p>
           <a:p>
@@ -4749,115 +4270,45 @@
               <a:rPr>
                 <a:latin typeface="Courier"/>
               </a:rPr>
-              <a:t>Bioconductor</a:t>
-            </a:r>
-            <a:r>
-              <a:rPr/>
-              <a:t> 软件（</a:t>
-            </a:r>
+              <a:t>ggplot2</a:t>
+            </a:r>
+            <a:r>
+              <a:rPr/>
+              <a:t> 软件包及图形语法</a:t>
+            </a:r>
+          </a:p>
+          <a:p>
+            <a:pPr lvl="1"/>
+            <a:r>
+              <a:rPr/>
+              <a:t>统计分析的数学基础</a:t>
+            </a:r>
+          </a:p>
+          <a:p>
+            <a:pPr lvl="1"/>
+            <a:r>
+              <a:rPr/>
+              <a:t>示例数据集的介绍</a:t>
+            </a:r>
+          </a:p>
+          <a:p>
+            <a:pPr lvl="1"/>
             <a:r>
               <a:rPr>
                 <a:latin typeface="Courier"/>
               </a:rPr>
-              <a:t>DESeq2</a:t>
-            </a:r>
-            <a:r>
-              <a:rPr/>
-              <a:t>、</a:t>
-            </a:r>
-            <a:r>
-              <a:rPr>
-                <a:latin typeface="Courier"/>
-              </a:rPr>
-              <a:t>ClusterProfiler</a:t>
-            </a:r>
-            <a:r>
-              <a:rPr/>
-              <a:t>、</a:t>
-            </a:r>
-            <a:r>
-              <a:rPr>
-                <a:latin typeface="Courier"/>
-              </a:rPr>
-              <a:t>enrichplot</a:t>
-            </a:r>
-            <a:r>
-              <a:rPr/>
-              <a:t>）</a:t>
+              <a:t>ggpubr</a:t>
+            </a:r>
+            <a:r>
+              <a:rPr/>
+              <a:t> 软件包的应用</a:t>
             </a:r>
           </a:p>
           <a:p>
             <a:pPr lvl="1"/>
             <a:r>
               <a:rPr/>
-              <a:t>基因功能数据库（</a:t>
-            </a:r>
-            <a:r>
-              <a:rPr>
-                <a:latin typeface="Courier"/>
-              </a:rPr>
-              <a:t>KEGG</a:t>
-            </a:r>
-            <a:r>
-              <a:rPr/>
-              <a:t>、</a:t>
-            </a:r>
-            <a:r>
-              <a:rPr>
-                <a:latin typeface="Courier"/>
-              </a:rPr>
-              <a:t>GO</a:t>
-            </a:r>
-            <a:r>
-              <a:rPr/>
-              <a:t>、</a:t>
-            </a:r>
-            <a:r>
-              <a:rPr>
-                <a:latin typeface="Courier"/>
-              </a:rPr>
-              <a:t>CAZyme</a:t>
-            </a:r>
-            <a:r>
-              <a:rPr/>
-              <a:t>、</a:t>
-            </a:r>
-            <a:r>
-              <a:rPr>
-                <a:latin typeface="Courier"/>
-              </a:rPr>
-              <a:t>ARG</a:t>
-            </a:r>
-            <a:r>
-              <a:rPr/>
-              <a:t>、</a:t>
-            </a:r>
-            <a:r>
-              <a:rPr>
-                <a:latin typeface="Courier"/>
-              </a:rPr>
-              <a:t>COG</a:t>
-            </a:r>
-            <a:r>
-              <a:rPr/>
-              <a:t>）</a:t>
-            </a:r>
-          </a:p>
-          <a:p>
-            <a:pPr lvl="1"/>
-            <a:r>
-              <a:rPr/>
-              <a:t>富集分析和 </a:t>
-            </a:r>
-            <a:r>
-              <a:rPr>
-                <a:latin typeface="Courier"/>
-              </a:rPr>
-              <a:t>GSEA</a:t>
-            </a:r>
-            <a:r>
-              <a:rPr/>
-              <a:t> 分析</a:t>
+              <a:t>分组比对、统计和可视化</a:t>
             </a:r>
           </a:p>
         </p:txBody>
@@ -4900,11 +4351,11 @@
           <a:lstStyle/>
           <a:p>
             <a:pPr lvl="0" indent="-342900" marL="342900">
-              <a:buAutoNum startAt="6" type="arabicPeriod"/>
+              <a:buAutoNum startAt="5" type="arabicPeriod"/>
             </a:pPr>
             <a:r>
               <a:rPr b="1"/>
-              <a:t>微生物组数据分析及可视化</a:t>
+              <a:t>转录组学数据分析和可视化</a:t>
             </a:r>
           </a:p>
           <a:p>
@@ -4913,34 +4364,131 @@
             </a:pPr>
             <a:r>
               <a:rPr/>
-              <a:t>以 dada2 软件包提供的示例数据为例，讲解微生物组数据分析和可视化的方法。</a:t>
-            </a:r>
-          </a:p>
-          <a:p>
-            <a:pPr lvl="1" indent="-342900" marL="685800">
-              <a:buAutoNum type="arabicPeriod"/>
-            </a:pPr>
-            <a:r>
-              <a:rPr/>
-              <a:t>dada2 软件包介绍</a:t>
-            </a:r>
-          </a:p>
-          <a:p>
-            <a:pPr lvl="1" indent="-342900" marL="685800">
-              <a:buAutoNum type="arabicPeriod"/>
-            </a:pPr>
-            <a:r>
-              <a:rPr/>
-              <a:t>微生物组数据分析流程</a:t>
-            </a:r>
-          </a:p>
-          <a:p>
-            <a:pPr lvl="1" indent="-342900" marL="685800">
-              <a:buAutoNum type="arabicPeriod"/>
-            </a:pPr>
-            <a:r>
-              <a:rPr/>
-              <a:t>微生物组数据可视化</a:t>
+              <a:t>以 2021 年发表在 ISME Communications 的论文为例，讲解转录组学数据分析和可视化的方法 (Gao, Cao, Ju, et al. 2021)。</a:t>
+            </a:r>
+          </a:p>
+          <a:p>
+            <a:pPr lvl="1"/>
+            <a:r>
+              <a:rPr/>
+              <a:t>转录组学分析的基本原理</a:t>
+            </a:r>
+          </a:p>
+          <a:p>
+            <a:pPr lvl="1"/>
+            <a:r>
+              <a:rPr>
+                <a:latin typeface="Courier"/>
+              </a:rPr>
+              <a:t>Bioconductor</a:t>
+            </a:r>
+            <a:r>
+              <a:rPr/>
+              <a:t> 软件（</a:t>
+            </a:r>
+            <a:r>
+              <a:rPr>
+                <a:latin typeface="Courier"/>
+              </a:rPr>
+              <a:t>DESeq2</a:t>
+            </a:r>
+            <a:r>
+              <a:rPr/>
+              <a:t>、</a:t>
+            </a:r>
+            <a:r>
+              <a:rPr>
+                <a:latin typeface="Courier"/>
+              </a:rPr>
+              <a:t>ClusterProfiler</a:t>
+            </a:r>
+            <a:r>
+              <a:rPr/>
+              <a:t>、</a:t>
+            </a:r>
+            <a:r>
+              <a:rPr>
+                <a:latin typeface="Courier"/>
+              </a:rPr>
+              <a:t>enrichplot</a:t>
+            </a:r>
+            <a:r>
+              <a:rPr/>
+              <a:t>）</a:t>
+            </a:r>
+          </a:p>
+          <a:p>
+            <a:pPr lvl="1"/>
+            <a:r>
+              <a:rPr/>
+              <a:t>基因功能数据库（</a:t>
+            </a:r>
+            <a:r>
+              <a:rPr>
+                <a:latin typeface="Courier"/>
+              </a:rPr>
+              <a:t>KEGG</a:t>
+            </a:r>
+            <a:r>
+              <a:rPr/>
+              <a:t>、</a:t>
+            </a:r>
+            <a:r>
+              <a:rPr>
+                <a:latin typeface="Courier"/>
+              </a:rPr>
+              <a:t>GO</a:t>
+            </a:r>
+            <a:r>
+              <a:rPr/>
+              <a:t>、</a:t>
+            </a:r>
+            <a:r>
+              <a:rPr>
+                <a:latin typeface="Courier"/>
+              </a:rPr>
+              <a:t>CAZyme</a:t>
+            </a:r>
+            <a:r>
+              <a:rPr/>
+              <a:t>、</a:t>
+            </a:r>
+            <a:r>
+              <a:rPr>
+                <a:latin typeface="Courier"/>
+              </a:rPr>
+              <a:t>ARG</a:t>
+            </a:r>
+            <a:r>
+              <a:rPr/>
+              <a:t>、</a:t>
+            </a:r>
+            <a:r>
+              <a:rPr>
+                <a:latin typeface="Courier"/>
+              </a:rPr>
+              <a:t>COG</a:t>
+            </a:r>
+            <a:r>
+              <a:rPr/>
+              <a:t>）</a:t>
+            </a:r>
+          </a:p>
+          <a:p>
+            <a:pPr lvl="1"/>
+            <a:r>
+              <a:rPr/>
+              <a:t>富集分析和 </a:t>
+            </a:r>
+            <a:r>
+              <a:rPr>
+                <a:latin typeface="Courier"/>
+              </a:rPr>
+              <a:t>GSEA</a:t>
+            </a:r>
+            <a:r>
+              <a:rPr/>
+              <a:t> 分析</a:t>
             </a:r>
           </a:p>
         </p:txBody>
@@ -4982,45 +4530,48 @@
           <a:bodyPr/>
           <a:lstStyle/>
           <a:p>
-            <a:pPr lvl="0" indent="0" marL="0">
-              <a:spcBef>
-                <a:spcPts val="3000"/>
-              </a:spcBef>
-              <a:buNone/>
+            <a:pPr lvl="0" indent="-342900" marL="342900">
+              <a:buAutoNum startAt="6" type="arabicPeriod"/>
             </a:pPr>
             <a:r>
               <a:rPr b="1"/>
-              <a:t>人工智能模块</a:t>
-            </a:r>
-          </a:p>
-          <a:p>
-            <a:pPr lvl="0" indent="-342900" marL="342900">
-              <a:buAutoNum startAt="7" type="arabicPeriod"/>
-            </a:pPr>
-            <a:r>
-              <a:rPr b="1"/>
-              <a:t>调用通用大语言模型执行任务</a:t>
-            </a:r>
-          </a:p>
-          <a:p>
-            <a:pPr lvl="1"/>
-            <a:r>
-              <a:rPr/>
-              <a:t>HuggingFace 和 Modelscope</a:t>
-            </a:r>
-          </a:p>
-          <a:p>
-            <a:pPr lvl="1"/>
-            <a:r>
-              <a:rPr/>
-              <a:t>ChatGPT 和 ChatGLM</a:t>
-            </a:r>
-          </a:p>
-          <a:p>
-            <a:pPr lvl="1"/>
-            <a:r>
-              <a:rPr/>
-              <a:t>模型性能评估（评测数据集、标准及测评工具Inspect）</a:t>
+              <a:t>微生物组数据分析及可视化</a:t>
+            </a:r>
+          </a:p>
+          <a:p>
+            <a:pPr lvl="1" indent="0" marL="342900">
+              <a:buNone/>
+            </a:pPr>
+            <a:r>
+              <a:rPr/>
+              <a:t>以 dada2 软件包提供的示例数据为例，讲解微生物组数据分析和可视化的方法。</a:t>
+            </a:r>
+          </a:p>
+          <a:p>
+            <a:pPr lvl="1" indent="-342900" marL="685800">
+              <a:buAutoNum type="arabicPeriod"/>
+            </a:pPr>
+            <a:r>
+              <a:rPr/>
+              <a:t>dada2 软件包介绍</a:t>
+            </a:r>
+          </a:p>
+          <a:p>
+            <a:pPr lvl="1" indent="-342900" marL="685800">
+              <a:buAutoNum type="arabicPeriod"/>
+            </a:pPr>
+            <a:r>
+              <a:rPr/>
+              <a:t>微生物组数据分析流程</a:t>
+            </a:r>
+          </a:p>
+          <a:p>
+            <a:pPr lvl="1" indent="-342900" marL="685800">
+              <a:buAutoNum type="arabicPeriod"/>
+            </a:pPr>
+            <a:r>
+              <a:rPr/>
+              <a:t>微生物组数据可视化</a:t>
             </a:r>
           </a:p>
         </p:txBody>
@@ -5062,42 +4613,45 @@
           <a:bodyPr/>
           <a:lstStyle/>
           <a:p>
+            <a:pPr lvl="0" indent="0" marL="0">
+              <a:spcBef>
+                <a:spcPts val="3000"/>
+              </a:spcBef>
+              <a:buNone/>
+            </a:pPr>
+            <a:r>
+              <a:rPr b="1"/>
+              <a:t>人工智能模块</a:t>
+            </a:r>
+          </a:p>
+          <a:p>
             <a:pPr lvl="0" indent="-342900" marL="342900">
-              <a:buAutoNum startAt="8" type="arabicPeriod"/>
+              <a:buAutoNum startAt="7" type="arabicPeriod"/>
             </a:pPr>
             <a:r>
               <a:rPr b="1"/>
-              <a:t>机器学习算法及实现</a:t>
-            </a:r>
-          </a:p>
-          <a:p>
-            <a:pPr lvl="1" indent="0" marL="342900">
-              <a:buNone/>
-            </a:pPr>
-            <a:r>
-              <a:rPr/>
-              <a:t>以熔解曲线数据建模为例，讲解机器学习算法及实现的方法。</a:t>
+              <a:t>调用通用大语言模型执行任务</a:t>
             </a:r>
           </a:p>
           <a:p>
             <a:pPr lvl="1"/>
             <a:r>
               <a:rPr/>
-              <a:t>线性回归及其变种</a:t>
+              <a:t>HuggingFace 和 Modelscope</a:t>
             </a:r>
           </a:p>
           <a:p>
             <a:pPr lvl="1"/>
             <a:r>
               <a:rPr/>
-              <a:t>决策树、随机森林</a:t>
+              <a:t>ChatGPT 和 ChatGLM</a:t>
             </a:r>
           </a:p>
           <a:p>
             <a:pPr lvl="1"/>
             <a:r>
               <a:rPr/>
-              <a:t>以熔解曲线数据建模为例</a:t>
+              <a:t>模型性能评估（评测数据集、标准及测评工具Inspect）</a:t>
             </a:r>
           </a:p>
         </p:txBody>
@@ -5140,11 +4694,11 @@
           <a:lstStyle/>
           <a:p>
             <a:pPr lvl="0" indent="-342900" marL="342900">
-              <a:buAutoNum startAt="9" type="arabicPeriod"/>
+              <a:buAutoNum startAt="8" type="arabicPeriod"/>
             </a:pPr>
             <a:r>
               <a:rPr b="1"/>
-              <a:t>手搓神经网络模型</a:t>
+              <a:t>机器学习算法及实现</a:t>
             </a:r>
           </a:p>
           <a:p>
@@ -5153,21 +4707,28 @@
             </a:pPr>
             <a:r>
               <a:rPr/>
-              <a:t>以手写字母识别为例，从零搭建一个 LeNet 神经网络模型。</a:t>
+              <a:t>以熔解曲线数据建模为例，讲解机器学习算法及实现的方法。</a:t>
             </a:r>
           </a:p>
           <a:p>
             <a:pPr lvl="1"/>
             <a:r>
               <a:rPr/>
-              <a:t>神经网络模型基本概念</a:t>
+              <a:t>线性回归及其变种</a:t>
             </a:r>
           </a:p>
           <a:p>
             <a:pPr lvl="1"/>
             <a:r>
               <a:rPr/>
-              <a:t>评估模型的准确率</a:t>
+              <a:t>决策树、随机森林</a:t>
+            </a:r>
+          </a:p>
+          <a:p>
+            <a:pPr lvl="1"/>
+            <a:r>
+              <a:rPr/>
+              <a:t>以熔解曲线数据建模为例</a:t>
             </a:r>
           </a:p>
         </p:txBody>
@@ -5210,11 +4771,11 @@
           <a:lstStyle/>
           <a:p>
             <a:pPr lvl="0" indent="-342900" marL="342900">
-              <a:buAutoNum startAt="10" type="arabicPeriod"/>
+              <a:buAutoNum startAt="9" type="arabicPeriod"/>
             </a:pPr>
             <a:r>
               <a:rPr b="1"/>
-              <a:t>利用拉曼光谱识别病原菌</a:t>
+              <a:t>手搓神经网络模型</a:t>
             </a:r>
           </a:p>
           <a:p>
@@ -5223,21 +4784,21 @@
             </a:pPr>
             <a:r>
               <a:rPr/>
-              <a:t>以发表在 Nature Communications 上的一篇论文为例，讲解拉曼光谱+残差网络的应用(Ho et al. 2019)。</a:t>
+              <a:t>以手写字母识别为例，从零搭建一个 LeNet 神经网络模型。</a:t>
             </a:r>
           </a:p>
           <a:p>
             <a:pPr lvl="1"/>
             <a:r>
               <a:rPr/>
-              <a:t>拉曼光谱技术</a:t>
+              <a:t>神经网络模型基本概念</a:t>
             </a:r>
           </a:p>
           <a:p>
             <a:pPr lvl="1"/>
             <a:r>
               <a:rPr/>
-              <a:t>ResNet 及残差网络</a:t>
+              <a:t>评估模型的准确率</a:t>
             </a:r>
           </a:p>
         </p:txBody>
@@ -5280,11 +4841,11 @@
           <a:lstStyle/>
           <a:p>
             <a:pPr lvl="0" indent="-342900" marL="342900">
-              <a:buAutoNum startAt="11" type="arabicPeriod"/>
+              <a:buAutoNum startAt="10" type="arabicPeriod"/>
             </a:pPr>
             <a:r>
               <a:rPr b="1"/>
-              <a:t>计算机视觉分析实验图片</a:t>
+              <a:t>利用拉曼光谱识别病原菌</a:t>
             </a:r>
           </a:p>
           <a:p>
@@ -5293,21 +4854,21 @@
             </a:pPr>
             <a:r>
               <a:rPr/>
-              <a:t>以植物图片分割为例，讲解如何使用计算机视觉技术分析实验图片。</a:t>
+              <a:t>以发表在 Nature Communications 上的一篇论文为例，讲解拉曼光谱+残差网络的应用(Ho et al. 2019)。</a:t>
             </a:r>
           </a:p>
           <a:p>
             <a:pPr lvl="1"/>
             <a:r>
               <a:rPr/>
-              <a:t>分割植株及背景</a:t>
+              <a:t>拉曼光谱技术</a:t>
             </a:r>
           </a:p>
           <a:p>
             <a:pPr lvl="1"/>
             <a:r>
               <a:rPr/>
-              <a:t>评价植物生长情况</a:t>
+              <a:t>ResNet 及残差网络</a:t>
             </a:r>
           </a:p>
         </p:txBody>
@@ -5349,24 +4910,12 @@
           <a:bodyPr/>
           <a:lstStyle/>
           <a:p>
-            <a:pPr lvl="0" indent="0" marL="0">
-              <a:spcBef>
-                <a:spcPts val="3000"/>
-              </a:spcBef>
-              <a:buNone/>
+            <a:pPr lvl="0" indent="-342900" marL="342900">
+              <a:buAutoNum startAt="11" type="arabicPeriod"/>
             </a:pPr>
             <a:r>
               <a:rPr b="1"/>
-              <a:t>开发协作模块</a:t>
-            </a:r>
-          </a:p>
-          <a:p>
-            <a:pPr lvl="0" indent="-342900" marL="342900">
-              <a:buAutoNum startAt="12" type="arabicPeriod"/>
-            </a:pPr>
-            <a:r>
-              <a:rPr b="1"/>
-              <a:t>与全世界开发者协作</a:t>
+              <a:t>计算机视觉分析实验图片</a:t>
             </a:r>
           </a:p>
           <a:p>
@@ -5375,42 +4924,21 @@
             </a:pPr>
             <a:r>
               <a:rPr/>
-              <a:t>讲解如何使用 GitHub 自动化，交流和创建网站。</a:t>
+              <a:t>以植物图片分割为例，讲解如何使用计算机视觉技术分析实验图片。</a:t>
             </a:r>
           </a:p>
           <a:p>
             <a:pPr lvl="1"/>
             <a:r>
               <a:rPr/>
-              <a:t>Fork、Pull Request</a:t>
+              <a:t>分割植株及背景</a:t>
             </a:r>
           </a:p>
           <a:p>
             <a:pPr lvl="1"/>
             <a:r>
               <a:rPr/>
-              <a:t>GitHub Actions</a:t>
-            </a:r>
-          </a:p>
-          <a:p>
-            <a:pPr lvl="1"/>
-            <a:r>
-              <a:rPr/>
-              <a:t>GitHub Issues</a:t>
-            </a:r>
-          </a:p>
-          <a:p>
-            <a:pPr lvl="1"/>
-            <a:r>
-              <a:rPr/>
-              <a:t>使用 Quarto 创建网站</a:t>
-            </a:r>
-          </a:p>
-          <a:p>
-            <a:pPr lvl="1"/>
-            <a:r>
-              <a:rPr/>
-              <a:t>部署 Netlify 静态网站</a:t>
+              <a:t>评价植物生长情况</a:t>
             </a:r>
           </a:p>
         </p:txBody>
@@ -5452,12 +4980,24 @@
           <a:bodyPr/>
           <a:lstStyle/>
           <a:p>
+            <a:pPr lvl="0" indent="0" marL="0">
+              <a:spcBef>
+                <a:spcPts val="3000"/>
+              </a:spcBef>
+              <a:buNone/>
+            </a:pPr>
+            <a:r>
+              <a:rPr b="1"/>
+              <a:t>开发协作模块</a:t>
+            </a:r>
+          </a:p>
+          <a:p>
             <a:pPr lvl="0" indent="-342900" marL="342900">
-              <a:buAutoNum startAt="13" type="arabicPeriod"/>
+              <a:buAutoNum startAt="12" type="arabicPeriod"/>
             </a:pPr>
             <a:r>
               <a:rPr b="1"/>
-              <a:t>开发 R 包</a:t>
+              <a:t>与全世界开发者协作</a:t>
             </a:r>
           </a:p>
           <a:p>
@@ -5466,35 +5006,42 @@
             </a:pPr>
             <a:r>
               <a:rPr/>
-              <a:t>以 ggVennDiagram 软件包开发为例，讲解如何开发软件包，让别人可以用来“复现”你的工作(Gao and Dusa 2024)。</a:t>
+              <a:t>讲解如何使用 GitHub 自动化，交流和创建网站。</a:t>
             </a:r>
           </a:p>
           <a:p>
             <a:pPr lvl="1"/>
             <a:r>
               <a:rPr/>
-              <a:t>devtools</a:t>
+              <a:t>Fork、Pull Request</a:t>
             </a:r>
           </a:p>
           <a:p>
             <a:pPr lvl="1"/>
             <a:r>
               <a:rPr/>
-              <a:t>usethis</a:t>
+              <a:t>GitHub Actions</a:t>
             </a:r>
           </a:p>
           <a:p>
             <a:pPr lvl="1"/>
             <a:r>
               <a:rPr/>
-              <a:t>Roxygen2</a:t>
+              <a:t>GitHub Issues</a:t>
             </a:r>
           </a:p>
           <a:p>
             <a:pPr lvl="1"/>
             <a:r>
               <a:rPr/>
-              <a:t>CRAN/Bioconductor</a:t>
+              <a:t>使用 Quarto 创建网站</a:t>
+            </a:r>
+          </a:p>
+          <a:p>
+            <a:pPr lvl="1"/>
+            <a:r>
+              <a:rPr/>
+              <a:t>部署 Netlify 静态网站</a:t>
             </a:r>
           </a:p>
         </p:txBody>
@@ -5536,90 +5083,49 @@
           <a:bodyPr/>
           <a:lstStyle/>
           <a:p>
-            <a:pPr lvl="0" indent="0" marL="0">
-              <a:spcBef>
-                <a:spcPts val="3000"/>
-              </a:spcBef>
-              <a:buNone/>
+            <a:pPr lvl="0" indent="-342900" marL="342900">
+              <a:buAutoNum startAt="13" type="arabicPeriod"/>
             </a:pPr>
             <a:r>
               <a:rPr b="1"/>
-              <a:t>重要提示</a:t>
-            </a:r>
-          </a:p>
-          <a:p>
-            <a:pPr lvl="0"/>
-            <a:r>
-              <a:rPr/>
-              <a:t>这是一门全新的课程，请同学们</a:t>
-            </a:r>
-            <a:r>
-              <a:rPr b="1"/>
-              <a:t>多提宝贵意见</a:t>
-            </a:r>
-            <a:r>
-              <a:rPr/>
-              <a:t>，参与课程完善的过程。</a:t>
-            </a:r>
-          </a:p>
-          <a:p>
-            <a:pPr lvl="0"/>
-            <a:r>
-              <a:rPr/>
-              <a:t>这是一门进阶课，课程有一定难度，请同学们在课堂内外</a:t>
-            </a:r>
-            <a:r>
-              <a:rPr b="1"/>
-              <a:t>多花有效时间</a:t>
-            </a:r>
-            <a:r>
-              <a:rPr/>
-              <a:t>。</a:t>
-            </a:r>
-          </a:p>
-          <a:p>
-            <a:pPr lvl="0"/>
-            <a:r>
-              <a:rPr/>
-              <a:t>这是一门实践课，请同学们一定要</a:t>
-            </a:r>
-            <a:r>
-              <a:rPr b="1"/>
-              <a:t>在自己的电脑上成功运行</a:t>
-            </a:r>
-            <a:r>
-              <a:rPr/>
-              <a:t>课程中教授的内容。</a:t>
-            </a:r>
-          </a:p>
-          <a:p>
-            <a:pPr lvl="0"/>
-            <a:r>
-              <a:rPr/>
-              <a:t>这是一门 AI 课，请同学们在学习的过程中</a:t>
-            </a:r>
-            <a:r>
-              <a:rPr b="1"/>
-              <a:t>主动寻求 AI 工具的帮助</a:t>
-            </a:r>
-            <a:r>
-              <a:rPr/>
-              <a:t>。</a:t>
-            </a:r>
-          </a:p>
-          <a:p>
-            <a:pPr lvl="0"/>
-            <a:r>
-              <a:rPr/>
-              <a:t>这是一门项目课，请同学们</a:t>
-            </a:r>
-            <a:r>
-              <a:rPr b="1"/>
-              <a:t>结合自己的研究需求</a:t>
-            </a:r>
-            <a:r>
-              <a:rPr/>
-              <a:t>深入的挖掘项目内容。</a:t>
+              <a:t>开发 R 包</a:t>
+            </a:r>
+          </a:p>
+          <a:p>
+            <a:pPr lvl="1" indent="0" marL="342900">
+              <a:buNone/>
+            </a:pPr>
+            <a:r>
+              <a:rPr/>
+              <a:t>以 ggVennDiagram 软件包开发为例，讲解如何开发软件包，让别人可以用来“复现”你的工作(Gao and Dusa 2024)。</a:t>
+            </a:r>
+          </a:p>
+          <a:p>
+            <a:pPr lvl="1"/>
+            <a:r>
+              <a:rPr/>
+              <a:t>devtools</a:t>
+            </a:r>
+          </a:p>
+          <a:p>
+            <a:pPr lvl="1"/>
+            <a:r>
+              <a:rPr/>
+              <a:t>usethis</a:t>
+            </a:r>
+          </a:p>
+          <a:p>
+            <a:pPr lvl="1"/>
+            <a:r>
+              <a:rPr/>
+              <a:t>Roxygen2</a:t>
+            </a:r>
+          </a:p>
+          <a:p>
+            <a:pPr lvl="1"/>
+            <a:r>
+              <a:rPr/>
+              <a:t>CRAN/Bioconductor</a:t>
             </a:r>
           </a:p>
         </p:txBody>
@@ -5648,6 +5154,31 @@
       </p:grpSpPr>
       <p:sp>
         <p:nvSpPr>
+          <p:cNvPr id="2" name="Title 1"/>
+          <p:cNvSpPr>
+            <a:spLocks noGrp="1"/>
+          </p:cNvSpPr>
+          <p:nvPr>
+            <p:ph type="title"/>
+          </p:nvPr>
+        </p:nvSpPr>
+        <p:spPr/>
+        <p:txBody>
+          <a:bodyPr/>
+          <a:lstStyle/>
+          <a:p>
+            <a:pPr lvl="0" indent="0" marL="0">
+              <a:buNone/>
+            </a:pPr>
+            <a:r>
+              <a:rPr/>
+              <a:t>课程资源</a:t>
+            </a:r>
+          </a:p>
+        </p:txBody>
+      </p:sp>
+      <p:sp>
+        <p:nvSpPr>
           <p:cNvPr id="3" name="Content Placeholder 2"/>
           <p:cNvSpPr>
             <a:spLocks noGrp="1"/>
@@ -5662,35 +5193,37 @@
           <a:lstStyle/>
           <a:p>
             <a:pPr lvl="0" indent="0" marL="0">
-              <a:spcBef>
-                <a:spcPts val="3000"/>
-              </a:spcBef>
-              <a:buNone/>
-            </a:pPr>
-            <a:r>
-              <a:rPr b="1"/>
-              <a:t>课程目标</a:t>
-            </a:r>
-          </a:p>
-          <a:p>
-            <a:pPr lvl="0"/>
-            <a:r>
-              <a:rPr/>
-              <a:t>理解数据驱动的可重复性研究的概念和重要性</a:t>
-            </a:r>
-          </a:p>
-          <a:p>
-            <a:pPr lvl="0"/>
-            <a:r>
-              <a:rPr/>
-              <a:t>掌握相关工具和技术，能够实施可重复性研究</a:t>
-            </a:r>
-          </a:p>
-          <a:p>
-            <a:pPr lvl="0"/>
-            <a:r>
-              <a:rPr/>
-              <a:t>培养数据分析和代码编写的能力，提高科研水平</a:t>
+              <a:buNone/>
+            </a:pPr>
+            <a:r>
+              <a:rPr>
+                <a:hlinkClick r:id="rId2"/>
+              </a:rPr>
+              <a:t>📺 点击查看本章教案 (docs)</a:t>
+            </a:r>
+            <a:r>
+              <a:rPr/>
+              <a:t> </a:t>
+            </a:r>
+            <a:r>
+              <a:rPr>
+                <a:hlinkClick r:id="rId3"/>
+              </a:rPr>
+              <a:t>📺 点击查看本章教案 (docs)</a:t>
+            </a:r>
+            <a:r>
+              <a:rPr/>
+              <a:t> </a:t>
+            </a:r>
+            <a:r>
+              <a:rPr>
+                <a:hlinkClick r:id="rId4"/>
+              </a:rPr>
+              <a:t>📺 点击查看本章教案 (docs)</a:t>
+            </a:r>
+            <a:r>
+              <a:rPr/>
+              <a:t> ::: notes Speaker notes go here. :::</a:t>
             </a:r>
           </a:p>
         </p:txBody>
@@ -5740,28 +5273,82 @@
             </a:pPr>
             <a:r>
               <a:rPr b="1"/>
-              <a:t>课后作业</a:t>
+              <a:t>重要提示</a:t>
             </a:r>
           </a:p>
           <a:p>
             <a:pPr lvl="0"/>
             <a:r>
               <a:rPr/>
-              <a:t>加入课程群组（QQ 群：973581293）</a:t>
+              <a:t>这是一门全新的课程，请同学们</a:t>
+            </a:r>
+            <a:r>
+              <a:rPr b="1"/>
+              <a:t>多提宝贵意见</a:t>
+            </a:r>
+            <a:r>
+              <a:rPr/>
+              <a:t>，参与课程完善的过程。</a:t>
             </a:r>
           </a:p>
           <a:p>
             <a:pPr lvl="0"/>
             <a:r>
               <a:rPr/>
-              <a:t>加入课程组织（GitHub Organization：https://github.com/D2RS-2025spring）</a:t>
+              <a:t>这是一门进阶课，课程有一定难度，请同学们在课堂内外</a:t>
+            </a:r>
+            <a:r>
+              <a:rPr b="1"/>
+              <a:t>多花有效时间</a:t>
+            </a:r>
+            <a:r>
+              <a:rPr/>
+              <a:t>。</a:t>
             </a:r>
           </a:p>
           <a:p>
             <a:pPr lvl="0"/>
             <a:r>
               <a:rPr/>
-              <a:t>自主建立学习小组（在雨课堂自行分组）</a:t>
+              <a:t>这是一门实践课，请同学们一定要</a:t>
+            </a:r>
+            <a:r>
+              <a:rPr b="1"/>
+              <a:t>在自己的电脑上成功运行</a:t>
+            </a:r>
+            <a:r>
+              <a:rPr/>
+              <a:t>课程中教授的内容。</a:t>
+            </a:r>
+          </a:p>
+          <a:p>
+            <a:pPr lvl="0"/>
+            <a:r>
+              <a:rPr/>
+              <a:t>这是一门 AI 课，请同学们在学习的过程中</a:t>
+            </a:r>
+            <a:r>
+              <a:rPr b="1"/>
+              <a:t>主动寻求 AI 工具的帮助</a:t>
+            </a:r>
+            <a:r>
+              <a:rPr/>
+              <a:t>。</a:t>
+            </a:r>
+          </a:p>
+          <a:p>
+            <a:pPr lvl="0"/>
+            <a:r>
+              <a:rPr/>
+              <a:t>这是一门项目课，请同学们</a:t>
+            </a:r>
+            <a:r>
+              <a:rPr b="1"/>
+              <a:t>结合自己的研究需求</a:t>
+            </a:r>
+            <a:r>
+              <a:rPr/>
+              <a:t>深入的挖掘项目内容。</a:t>
             </a:r>
           </a:p>
         </p:txBody>
@@ -5811,6 +5398,77 @@
             </a:pPr>
             <a:r>
               <a:rPr b="1"/>
+              <a:t>课后作业</a:t>
+            </a:r>
+          </a:p>
+          <a:p>
+            <a:pPr lvl="0"/>
+            <a:r>
+              <a:rPr/>
+              <a:t>加入课程群组（QQ 群：973581293）</a:t>
+            </a:r>
+          </a:p>
+          <a:p>
+            <a:pPr lvl="0"/>
+            <a:r>
+              <a:rPr/>
+              <a:t>加入课程组织（GitHub Organization：https://github.com/D2RS-2025spring）</a:t>
+            </a:r>
+          </a:p>
+          <a:p>
+            <a:pPr lvl="0"/>
+            <a:r>
+              <a:rPr/>
+              <a:t>自主建立学习小组（在雨课堂自行分组）</a:t>
+            </a:r>
+          </a:p>
+        </p:txBody>
+      </p:sp>
+    </p:spTree>
+  </p:cSld>
+</p:sld>
+</file>
+
+<file path=ppt/slides/slide32.xml><?xml version="1.0" encoding="utf-8"?>
+<p:sld xmlns:a="http://schemas.openxmlformats.org/drawingml/2006/main" xmlns:r="http://schemas.openxmlformats.org/officeDocument/2006/relationships" xmlns:p="http://schemas.openxmlformats.org/presentationml/2006/main">
+  <p:cSld>
+    <p:spTree>
+      <p:nvGrpSpPr>
+        <p:cNvPr id="1" name=""/>
+        <p:cNvGrpSpPr/>
+        <p:nvPr/>
+      </p:nvGrpSpPr>
+      <p:grpSpPr>
+        <a:xfrm>
+          <a:off x="0" y="0"/>
+          <a:ext cx="0" cy="0"/>
+          <a:chOff x="0" y="0"/>
+          <a:chExt cx="0" cy="0"/>
+        </a:xfrm>
+      </p:grpSpPr>
+      <p:sp>
+        <p:nvSpPr>
+          <p:cNvPr id="3" name="Content Placeholder 2"/>
+          <p:cNvSpPr>
+            <a:spLocks noGrp="1"/>
+          </p:cNvSpPr>
+          <p:nvPr>
+            <p:ph idx="1"/>
+          </p:nvPr>
+        </p:nvSpPr>
+        <p:spPr/>
+        <p:txBody>
+          <a:bodyPr/>
+          <a:lstStyle/>
+          <a:p>
+            <a:pPr lvl="0" indent="0" marL="0">
+              <a:spcBef>
+                <a:spcPts val="3000"/>
+              </a:spcBef>
+              <a:buNone/>
+            </a:pPr>
+            <a:r>
+              <a:rPr b="1"/>
               <a:t>References</a:t>
             </a:r>
           </a:p>
@@ -5969,28 +5627,28 @@
             </a:pPr>
             <a:r>
               <a:rPr b="1"/>
-              <a:t>课程特色</a:t>
+              <a:t>课程目标</a:t>
             </a:r>
           </a:p>
           <a:p>
             <a:pPr lvl="0"/>
             <a:r>
               <a:rPr/>
-              <a:t>强调数据和代码的规范化，确保可重复性</a:t>
+              <a:t>理解数据驱动的可重复性研究的概念和重要性</a:t>
             </a:r>
           </a:p>
           <a:p>
             <a:pPr lvl="0"/>
             <a:r>
               <a:rPr/>
-              <a:t>以项目为导向，关注实际应用场景</a:t>
+              <a:t>掌握相关工具和技术，能够实施可重复性研究</a:t>
             </a:r>
           </a:p>
           <a:p>
             <a:pPr lvl="0"/>
             <a:r>
               <a:rPr/>
-              <a:t>注重实践操作，强调动手能力</a:t>
+              <a:t>培养数据分析和代码编写的能力，提高科研水平</a:t>
             </a:r>
           </a:p>
         </p:txBody>
@@ -6040,60 +5698,28 @@
             </a:pPr>
             <a:r>
               <a:rPr b="1"/>
-              <a:t>课堂组织形式</a:t>
-            </a:r>
-          </a:p>
-          <a:p>
-            <a:pPr lvl="0" indent="0" marL="0">
-              <a:buNone/>
-            </a:pPr>
-            <a:r>
-              <a:rPr/>
-              <a:t>因为选课场地限制，无法提供机房。请选课的同学自行准备电脑，并根据课程进度安排，确保电脑上安装了 R、Python 等需要用到的软件。</a:t>
+              <a:t>课程特色</a:t>
             </a:r>
           </a:p>
           <a:p>
             <a:pPr lvl="0"/>
             <a:r>
-              <a:rPr b="1"/>
-              <a:t>课堂讲解</a:t>
-            </a:r>
-            <a:r>
-              <a:rPr/>
-              <a:t>：介绍相关概念、方法和工具</a:t>
+              <a:rPr/>
+              <a:t>强调数据和代码的规范化，确保可重复性</a:t>
             </a:r>
           </a:p>
           <a:p>
             <a:pPr lvl="0"/>
             <a:r>
-              <a:rPr b="1"/>
-              <a:t>实践操作</a:t>
-            </a:r>
-            <a:r>
-              <a:rPr/>
-              <a:t>：通过实际案例进行动手实践</a:t>
+              <a:rPr/>
+              <a:t>以项目为导向，关注实际应用场景</a:t>
             </a:r>
           </a:p>
           <a:p>
             <a:pPr lvl="0"/>
             <a:r>
-              <a:rPr b="1"/>
-              <a:t>小组讨论</a:t>
-            </a:r>
-            <a:r>
-              <a:rPr/>
-              <a:t>：学生之间进行交流与协作</a:t>
-            </a:r>
-          </a:p>
-          <a:p>
-            <a:pPr lvl="0"/>
-            <a:r>
-              <a:rPr b="1"/>
-              <a:t>课后作业</a:t>
-            </a:r>
-            <a:r>
-              <a:rPr/>
-              <a:t>：巩固所学知识，提高实践能力</a:t>
+              <a:rPr/>
+              <a:t>注重实践操作，强调动手能力</a:t>
             </a:r>
           </a:p>
         </p:txBody>
@@ -6143,21 +5769,60 @@
             </a:pPr>
             <a:r>
               <a:rPr b="1"/>
-              <a:t>如何分组？</a:t>
+              <a:t>课堂组织形式</a:t>
+            </a:r>
+          </a:p>
+          <a:p>
+            <a:pPr lvl="0" indent="0" marL="0">
+              <a:buNone/>
+            </a:pPr>
+            <a:r>
+              <a:rPr/>
+              <a:t>因为选课场地限制，无法提供机房。请选课的同学自行准备电脑，并根据课程进度安排，确保电脑上安装了 R、Python 等需要用到的软件。</a:t>
             </a:r>
           </a:p>
           <a:p>
             <a:pPr lvl="0"/>
             <a:r>
-              <a:rPr/>
-              <a:t>请研究生们根据自己的实验室或者研究方向，自行分组，每组人数不超过 10 人。</a:t>
+              <a:rPr b="1"/>
+              <a:t>课堂讲解</a:t>
+            </a:r>
+            <a:r>
+              <a:rPr/>
+              <a:t>：介绍相关概念、方法和工具</a:t>
             </a:r>
           </a:p>
           <a:p>
             <a:pPr lvl="0"/>
             <a:r>
-              <a:rPr/>
-              <a:t>在第二次课程开始前，请在雨课堂内确认分组。</a:t>
+              <a:rPr b="1"/>
+              <a:t>实践操作</a:t>
+            </a:r>
+            <a:r>
+              <a:rPr/>
+              <a:t>：通过实际案例进行动手实践</a:t>
+            </a:r>
+          </a:p>
+          <a:p>
+            <a:pPr lvl="0"/>
+            <a:r>
+              <a:rPr b="1"/>
+              <a:t>小组讨论</a:t>
+            </a:r>
+            <a:r>
+              <a:rPr/>
+              <a:t>：学生之间进行交流与协作</a:t>
+            </a:r>
+          </a:p>
+          <a:p>
+            <a:pPr lvl="0"/>
+            <a:r>
+              <a:rPr b="1"/>
+              <a:t>课后作业</a:t>
+            </a:r>
+            <a:r>
+              <a:rPr/>
+              <a:t>：巩固所学知识，提高实践能力</a:t>
             </a:r>
           </a:p>
         </p:txBody>
@@ -6207,34 +5872,21 @@
             </a:pPr>
             <a:r>
               <a:rPr b="1"/>
-              <a:t>如何考察？</a:t>
+              <a:t>如何分组？</a:t>
             </a:r>
           </a:p>
           <a:p>
             <a:pPr lvl="0"/>
             <a:r>
               <a:rPr/>
-              <a:t>使用课程中教授的技能，创建一个数据分析、软件开发、研究复现等类型的项目</a:t>
+              <a:t>请自行分组，每组人数不低于 3 人，不超过 5 人。</a:t>
             </a:r>
           </a:p>
           <a:p>
             <a:pPr lvl="0"/>
             <a:r>
               <a:rPr/>
-              <a:t>3 - 5 人一组共创一个项目，将项目代码提交到</a:t>
-            </a:r>
-            <a:r>
-              <a:rPr>
-                <a:hlinkClick r:id="rId2"/>
-              </a:rPr>
-              <a:t>课程仓库</a:t>
-            </a:r>
-          </a:p>
-          <a:p>
-            <a:pPr lvl="0"/>
-            <a:r>
-              <a:rPr/>
-              <a:t>需要保证每个人在项目中都有贡献（通过 Git 追踪）。</a:t>
+              <a:t>在第二次课程开始前，请在雨课堂内确认分组。</a:t>
             </a:r>
           </a:p>
         </p:txBody>
@@ -6284,52 +5936,34 @@
             </a:pPr>
             <a:r>
               <a:rPr b="1"/>
-              <a:t>上课时间</a:t>
+              <a:t>如何考察？</a:t>
             </a:r>
           </a:p>
           <a:p>
             <a:pPr lvl="0"/>
             <a:r>
               <a:rPr/>
-              <a:t>本课程含理论和上机实验。</a:t>
+              <a:t>使用课程中教授的技能，创建一个数据分析、软件开发、研究复现等类型的项目</a:t>
             </a:r>
           </a:p>
           <a:p>
             <a:pPr lvl="0"/>
             <a:r>
               <a:rPr/>
-              <a:t>一共 10 次课，共 32 学时。</a:t>
-            </a:r>
-          </a:p>
-          <a:p>
-            <a:pPr lvl="0" indent="0" marL="0">
-              <a:buNone/>
-            </a:pPr>
-          </a:p>
-          <a:p>
-            <a:pPr lvl="0" indent="0" marL="0">
-              <a:spcBef>
-                <a:spcPts val="3000"/>
-              </a:spcBef>
-              <a:buNone/>
-            </a:pPr>
-            <a:r>
-              <a:rPr b="1"/>
-              <a:t>2025年春季学期</a:t>
+              <a:t>3 - 5 人一组共创一个项目，将项目代码提交到</a:t>
+            </a:r>
+            <a:r>
+              <a:rPr>
+                <a:hlinkClick r:id="rId2"/>
+              </a:rPr>
+              <a:t>课程仓库</a:t>
             </a:r>
           </a:p>
           <a:p>
             <a:pPr lvl="0"/>
             <a:r>
               <a:rPr/>
-              <a:t>时间：自 2025-02-17 至 2025-03-20，每周一、周四晚上</a:t>
-            </a:r>
-          </a:p>
-          <a:p>
-            <a:pPr lvl="0"/>
-            <a:r>
-              <a:rPr/>
-              <a:t>地点：相约三教阶梯教室 S2</a:t>
+              <a:t>需要保证每个人在项目中都有贡献（通过 Git 追踪）。</a:t>
             </a:r>
           </a:p>
         </p:txBody>
@@ -6379,21 +6013,52 @@
             </a:pPr>
             <a:r>
               <a:rPr b="1"/>
-              <a:t>项目驱动</a:t>
+              <a:t>上课时间</a:t>
             </a:r>
           </a:p>
           <a:p>
             <a:pPr lvl="0"/>
             <a:r>
               <a:rPr/>
-              <a:t>每次课程围绕一个独立但相互关联的项目展开</a:t>
+              <a:t>本课程含理论和上机实验。</a:t>
             </a:r>
           </a:p>
           <a:p>
             <a:pPr lvl="0"/>
             <a:r>
               <a:rPr/>
-              <a:t>所有项目可分为 4 个模块</a:t>
+              <a:t>一共 10 次课，共 32 学时。</a:t>
+            </a:r>
+          </a:p>
+          <a:p>
+            <a:pPr lvl="0" indent="0" marL="0">
+              <a:buNone/>
+            </a:pPr>
+          </a:p>
+          <a:p>
+            <a:pPr lvl="0" indent="0" marL="0">
+              <a:spcBef>
+                <a:spcPts val="3000"/>
+              </a:spcBef>
+              <a:buNone/>
+            </a:pPr>
+            <a:r>
+              <a:rPr b="1"/>
+              <a:t>2027年春季学期</a:t>
+            </a:r>
+          </a:p>
+          <a:p>
+            <a:pPr lvl="0"/>
+            <a:r>
+              <a:rPr/>
+              <a:t>时间：自 2027-02-17 至 2027-03-20，每周一、周四晚上</a:t>
+            </a:r>
+          </a:p>
+          <a:p>
+            <a:pPr lvl="0"/>
+            <a:r>
+              <a:rPr/>
+              <a:t>地点：相约三教阶梯教室 S2</a:t>
             </a:r>
           </a:p>
         </p:txBody>

</xml_diff>